<commit_message>
Short slides for Colin
</commit_message>
<xml_diff>
--- a/files/otto_slides.pptx
+++ b/files/otto_slides.pptx
@@ -255,7 +255,7 @@
           <a:p>
             <a:fld id="{6F1100B5-9E82-407B-B26A-0BB3860728BE}" type="datetimeFigureOut">
               <a:rPr lang="en-US" smtClean="0"/>
-              <a:t>10/28/2016</a:t>
+              <a:t>1/23/2017</a:t>
             </a:fld>
             <a:endParaRPr lang="en-US"/>
           </a:p>
@@ -423,7 +423,7 @@
           <a:p>
             <a:fld id="{6F1100B5-9E82-407B-B26A-0BB3860728BE}" type="datetimeFigureOut">
               <a:rPr lang="en-US" smtClean="0"/>
-              <a:t>10/28/2016</a:t>
+              <a:t>1/23/2017</a:t>
             </a:fld>
             <a:endParaRPr lang="en-US"/>
           </a:p>
@@ -601,7 +601,7 @@
           <a:p>
             <a:fld id="{6F1100B5-9E82-407B-B26A-0BB3860728BE}" type="datetimeFigureOut">
               <a:rPr lang="en-US" smtClean="0"/>
-              <a:t>10/28/2016</a:t>
+              <a:t>1/23/2017</a:t>
             </a:fld>
             <a:endParaRPr lang="en-US"/>
           </a:p>
@@ -769,7 +769,7 @@
           <a:p>
             <a:fld id="{6F1100B5-9E82-407B-B26A-0BB3860728BE}" type="datetimeFigureOut">
               <a:rPr lang="en-US" smtClean="0"/>
-              <a:t>10/28/2016</a:t>
+              <a:t>1/23/2017</a:t>
             </a:fld>
             <a:endParaRPr lang="en-US"/>
           </a:p>
@@ -1014,7 +1014,7 @@
           <a:p>
             <a:fld id="{6F1100B5-9E82-407B-B26A-0BB3860728BE}" type="datetimeFigureOut">
               <a:rPr lang="en-US" smtClean="0"/>
-              <a:t>10/28/2016</a:t>
+              <a:t>1/23/2017</a:t>
             </a:fld>
             <a:endParaRPr lang="en-US"/>
           </a:p>
@@ -1243,7 +1243,7 @@
           <a:p>
             <a:fld id="{6F1100B5-9E82-407B-B26A-0BB3860728BE}" type="datetimeFigureOut">
               <a:rPr lang="en-US" smtClean="0"/>
-              <a:t>10/28/2016</a:t>
+              <a:t>1/23/2017</a:t>
             </a:fld>
             <a:endParaRPr lang="en-US"/>
           </a:p>
@@ -1607,7 +1607,7 @@
           <a:p>
             <a:fld id="{6F1100B5-9E82-407B-B26A-0BB3860728BE}" type="datetimeFigureOut">
               <a:rPr lang="en-US" smtClean="0"/>
-              <a:t>10/28/2016</a:t>
+              <a:t>1/23/2017</a:t>
             </a:fld>
             <a:endParaRPr lang="en-US"/>
           </a:p>
@@ -1724,7 +1724,7 @@
           <a:p>
             <a:fld id="{6F1100B5-9E82-407B-B26A-0BB3860728BE}" type="datetimeFigureOut">
               <a:rPr lang="en-US" smtClean="0"/>
-              <a:t>10/28/2016</a:t>
+              <a:t>1/23/2017</a:t>
             </a:fld>
             <a:endParaRPr lang="en-US"/>
           </a:p>
@@ -1819,7 +1819,7 @@
           <a:p>
             <a:fld id="{6F1100B5-9E82-407B-B26A-0BB3860728BE}" type="datetimeFigureOut">
               <a:rPr lang="en-US" smtClean="0"/>
-              <a:t>10/28/2016</a:t>
+              <a:t>1/23/2017</a:t>
             </a:fld>
             <a:endParaRPr lang="en-US"/>
           </a:p>
@@ -2094,7 +2094,7 @@
           <a:p>
             <a:fld id="{6F1100B5-9E82-407B-B26A-0BB3860728BE}" type="datetimeFigureOut">
               <a:rPr lang="en-US" smtClean="0"/>
-              <a:t>10/28/2016</a:t>
+              <a:t>1/23/2017</a:t>
             </a:fld>
             <a:endParaRPr lang="en-US"/>
           </a:p>
@@ -2346,7 +2346,7 @@
           <a:p>
             <a:fld id="{6F1100B5-9E82-407B-B26A-0BB3860728BE}" type="datetimeFigureOut">
               <a:rPr lang="en-US" smtClean="0"/>
-              <a:t>10/28/2016</a:t>
+              <a:t>1/23/2017</a:t>
             </a:fld>
             <a:endParaRPr lang="en-US"/>
           </a:p>
@@ -2557,7 +2557,7 @@
           <a:p>
             <a:fld id="{6F1100B5-9E82-407B-B26A-0BB3860728BE}" type="datetimeFigureOut">
               <a:rPr lang="en-US" smtClean="0"/>
-              <a:t>10/28/2016</a:t>
+              <a:t>1/23/2017</a:t>
             </a:fld>
             <a:endParaRPr lang="en-US"/>
           </a:p>
@@ -4309,9 +4309,10 @@
           <a:p>
             <a:pPr lvl="1"/>
             <a:r>
-              <a:rPr lang="en-US" dirty="0"/>
-              <a:t>OAuth,</a:t>
-            </a:r>
+              <a:rPr lang="en-US"/>
+              <a:t>OAuth</a:t>
+            </a:r>
+            <a:endParaRPr lang="en-US" dirty="0"/>
           </a:p>
           <a:p>
             <a:pPr lvl="1"/>
@@ -4649,7 +4650,7 @@
           <a:graphicData uri="http://schemas.openxmlformats.org/presentationml/2006/ole">
             <mc:AlternateContent xmlns:mc="http://schemas.openxmlformats.org/markup-compatibility/2006">
               <mc:Choice xmlns:v="urn:schemas-microsoft-com:vml" Requires="v">
-                <p:oleObj spid="_x0000_s1045" name="Worksheet" r:id="rId3" imgW="7177963" imgH="1790710" progId="Excel.Sheet.12">
+                <p:oleObj spid="_x0000_s1046" name="Worksheet" r:id="rId3" imgW="7177963" imgH="1790710" progId="Excel.Sheet.12">
                   <p:embed/>
                 </p:oleObj>
               </mc:Choice>
@@ -4763,7 +4764,7 @@
           <a:graphicData uri="http://schemas.openxmlformats.org/presentationml/2006/ole">
             <mc:AlternateContent xmlns:mc="http://schemas.openxmlformats.org/markup-compatibility/2006">
               <mc:Choice xmlns:v="urn:schemas-microsoft-com:vml" Requires="v">
-                <p:oleObj spid="_x0000_s2068" name="Worksheet" r:id="rId3" imgW="7177963" imgH="998179" progId="Excel.Sheet.12">
+                <p:oleObj spid="_x0000_s2069" name="Worksheet" r:id="rId3" imgW="7177963" imgH="998179" progId="Excel.Sheet.12">
                   <p:embed/>
                 </p:oleObj>
               </mc:Choice>
@@ -4877,7 +4878,7 @@
           <a:graphicData uri="http://schemas.openxmlformats.org/presentationml/2006/ole">
             <mc:AlternateContent xmlns:mc="http://schemas.openxmlformats.org/markup-compatibility/2006">
               <mc:Choice xmlns:v="urn:schemas-microsoft-com:vml" Requires="v">
-                <p:oleObj spid="_x0000_s3091" name="Worksheet" r:id="rId3" imgW="7361028" imgH="1394553" progId="Excel.Sheet.12">
+                <p:oleObj spid="_x0000_s3092" name="Worksheet" r:id="rId3" imgW="7361028" imgH="1394553" progId="Excel.Sheet.12">
                   <p:embed/>
                 </p:oleObj>
               </mc:Choice>
@@ -4991,7 +4992,7 @@
           <a:graphicData uri="http://schemas.openxmlformats.org/presentationml/2006/ole">
             <mc:AlternateContent xmlns:mc="http://schemas.openxmlformats.org/markup-compatibility/2006">
               <mc:Choice xmlns:v="urn:schemas-microsoft-com:vml" Requires="v">
-                <p:oleObj spid="_x0000_s4115" name="Worksheet" r:id="rId3" imgW="7361028" imgH="403942" progId="Excel.Sheet.12">
+                <p:oleObj spid="_x0000_s4116" name="Worksheet" r:id="rId3" imgW="7361028" imgH="403942" progId="Excel.Sheet.12">
                   <p:embed/>
                 </p:oleObj>
               </mc:Choice>

</xml_diff>